<commit_message>
added some syntax basics
</commit_message>
<xml_diff>
--- a/20130625_TypeScript.pptx
+++ b/20130625_TypeScript.pptx
@@ -224,7 +224,7 @@
           <a:p>
             <a:fld id="{6EBE45C2-1147-4836-8E0B-E6D95AAC8987}" type="datetimeFigureOut">
               <a:rPr lang="en-US" smtClean="0"/>
-              <a:t>6/24/2013</a:t>
+              <a:t>6/25/2013</a:t>
             </a:fld>
             <a:endParaRPr lang="en-US"/>
           </a:p>
@@ -1009,7 +1009,7 @@
             <a:fld id="{125EDE23-284B-4032-BB13-15D18E5884FA}" type="datetimeFigureOut">
               <a:rPr lang="en-US" smtClean="0"/>
               <a:pPr/>
-              <a:t>6/24/2013</a:t>
+              <a:t>6/25/2013</a:t>
             </a:fld>
             <a:endParaRPr lang="en-US"/>
           </a:p>
@@ -1111,7 +1111,7 @@
           </a:ln>
           <a:extLst>
             <a:ext uri="{91240B29-F687-4f45-9708-019B960494DF}">
-              <a14:hiddenLine xmlns="" xmlns:a14="http://schemas.microsoft.com/office/drawing/2010/main" w="9525">
+              <a14:hiddenLine xmlns:a14="http://schemas.microsoft.com/office/drawing/2010/main" xmlns="" w="9525">
                 <a:solidFill>
                   <a:srgbClr val="000000"/>
                 </a:solidFill>
@@ -1166,7 +1166,7 @@
           </a:ln>
           <a:extLst>
             <a:ext uri="{91240B29-F687-4f45-9708-019B960494DF}">
-              <a14:hiddenLine xmlns="" xmlns:a14="http://schemas.microsoft.com/office/drawing/2010/main" w="9525">
+              <a14:hiddenLine xmlns:a14="http://schemas.microsoft.com/office/drawing/2010/main" xmlns="" w="9525">
                 <a:solidFill>
                   <a:srgbClr val="000000"/>
                 </a:solidFill>
@@ -1422,7 +1422,7 @@
             <a:fld id="{125EDE23-284B-4032-BB13-15D18E5884FA}" type="datetimeFigureOut">
               <a:rPr lang="en-US" smtClean="0"/>
               <a:pPr/>
-              <a:t>6/24/2013</a:t>
+              <a:t>6/25/2013</a:t>
             </a:fld>
             <a:endParaRPr lang="en-US"/>
           </a:p>
@@ -1672,7 +1672,7 @@
             <a:fld id="{125EDE23-284B-4032-BB13-15D18E5884FA}" type="datetimeFigureOut">
               <a:rPr lang="en-US" smtClean="0"/>
               <a:pPr/>
-              <a:t>6/24/2013</a:t>
+              <a:t>6/25/2013</a:t>
             </a:fld>
             <a:endParaRPr lang="en-US"/>
           </a:p>
@@ -2214,7 +2214,7 @@
             <a:fld id="{125EDE23-284B-4032-BB13-15D18E5884FA}" type="datetimeFigureOut">
               <a:rPr lang="en-US" smtClean="0"/>
               <a:pPr/>
-              <a:t>6/24/2013</a:t>
+              <a:t>6/25/2013</a:t>
             </a:fld>
             <a:endParaRPr lang="en-US"/>
           </a:p>
@@ -2464,7 +2464,7 @@
             <a:fld id="{125EDE23-284B-4032-BB13-15D18E5884FA}" type="datetimeFigureOut">
               <a:rPr lang="en-US" smtClean="0"/>
               <a:pPr/>
-              <a:t>6/24/2013</a:t>
+              <a:t>6/25/2013</a:t>
             </a:fld>
             <a:endParaRPr lang="en-US"/>
           </a:p>
@@ -2998,7 +2998,7 @@
             <a:fld id="{125EDE23-284B-4032-BB13-15D18E5884FA}" type="datetimeFigureOut">
               <a:rPr lang="en-US" smtClean="0"/>
               <a:pPr/>
-              <a:t>6/24/2013</a:t>
+              <a:t>6/25/2013</a:t>
             </a:fld>
             <a:endParaRPr lang="en-US"/>
           </a:p>
@@ -3297,7 +3297,7 @@
             <a:fld id="{125EDE23-284B-4032-BB13-15D18E5884FA}" type="datetimeFigureOut">
               <a:rPr lang="en-US" smtClean="0"/>
               <a:pPr/>
-              <a:t>6/24/2013</a:t>
+              <a:t>6/25/2013</a:t>
             </a:fld>
             <a:endParaRPr lang="en-US"/>
           </a:p>
@@ -3473,7 +3473,7 @@
             <a:fld id="{125EDE23-284B-4032-BB13-15D18E5884FA}" type="datetimeFigureOut">
               <a:rPr lang="en-US" smtClean="0"/>
               <a:pPr/>
-              <a:t>6/24/2013</a:t>
+              <a:t>6/25/2013</a:t>
             </a:fld>
             <a:endParaRPr lang="en-US"/>
           </a:p>
@@ -3655,7 +3655,7 @@
             <a:fld id="{125EDE23-284B-4032-BB13-15D18E5884FA}" type="datetimeFigureOut">
               <a:rPr lang="en-US" smtClean="0"/>
               <a:pPr/>
-              <a:t>6/24/2013</a:t>
+              <a:t>6/25/2013</a:t>
             </a:fld>
             <a:endParaRPr lang="en-US"/>
           </a:p>
@@ -3842,7 +3842,7 @@
             <a:fld id="{125EDE23-284B-4032-BB13-15D18E5884FA}" type="datetimeFigureOut">
               <a:rPr lang="en-US" smtClean="0"/>
               <a:pPr/>
-              <a:t>6/24/2013</a:t>
+              <a:t>6/25/2013</a:t>
             </a:fld>
             <a:endParaRPr lang="en-US"/>
           </a:p>
@@ -4100,7 +4100,7 @@
             <a:fld id="{125EDE23-284B-4032-BB13-15D18E5884FA}" type="datetimeFigureOut">
               <a:rPr lang="en-US" smtClean="0"/>
               <a:pPr/>
-              <a:t>6/24/2013</a:t>
+              <a:t>6/25/2013</a:t>
             </a:fld>
             <a:endParaRPr lang="en-US"/>
           </a:p>
@@ -4404,7 +4404,7 @@
             <a:fld id="{125EDE23-284B-4032-BB13-15D18E5884FA}" type="datetimeFigureOut">
               <a:rPr lang="en-US" smtClean="0"/>
               <a:pPr/>
-              <a:t>6/24/2013</a:t>
+              <a:t>6/25/2013</a:t>
             </a:fld>
             <a:endParaRPr lang="en-US"/>
           </a:p>
@@ -4848,7 +4848,7 @@
             <a:fld id="{125EDE23-284B-4032-BB13-15D18E5884FA}" type="datetimeFigureOut">
               <a:rPr lang="en-US" smtClean="0"/>
               <a:pPr/>
-              <a:t>6/24/2013</a:t>
+              <a:t>6/25/2013</a:t>
             </a:fld>
             <a:endParaRPr lang="en-US"/>
           </a:p>
@@ -4968,7 +4968,7 @@
             <a:fld id="{125EDE23-284B-4032-BB13-15D18E5884FA}" type="datetimeFigureOut">
               <a:rPr lang="en-US" smtClean="0"/>
               <a:pPr/>
-              <a:t>6/24/2013</a:t>
+              <a:t>6/25/2013</a:t>
             </a:fld>
             <a:endParaRPr lang="en-US"/>
           </a:p>
@@ -5065,7 +5065,7 @@
             <a:fld id="{125EDE23-284B-4032-BB13-15D18E5884FA}" type="datetimeFigureOut">
               <a:rPr lang="en-US" smtClean="0"/>
               <a:pPr/>
-              <a:t>6/24/2013</a:t>
+              <a:t>6/25/2013</a:t>
             </a:fld>
             <a:endParaRPr lang="en-US"/>
           </a:p>
@@ -5350,7 +5350,7 @@
             <a:fld id="{125EDE23-284B-4032-BB13-15D18E5884FA}" type="datetimeFigureOut">
               <a:rPr lang="en-US" smtClean="0"/>
               <a:pPr/>
-              <a:t>6/24/2013</a:t>
+              <a:t>6/25/2013</a:t>
             </a:fld>
             <a:endParaRPr lang="en-US"/>
           </a:p>
@@ -5643,7 +5643,7 @@
             <a:fld id="{125EDE23-284B-4032-BB13-15D18E5884FA}" type="datetimeFigureOut">
               <a:rPr lang="en-US" smtClean="0"/>
               <a:pPr/>
-              <a:t>6/24/2013</a:t>
+              <a:t>6/25/2013</a:t>
             </a:fld>
             <a:endParaRPr lang="en-US"/>
           </a:p>
@@ -6169,7 +6169,7 @@
             <a:fld id="{125EDE23-284B-4032-BB13-15D18E5884FA}" type="datetimeFigureOut">
               <a:rPr lang="en-US" smtClean="0"/>
               <a:pPr/>
-              <a:t>6/24/2013</a:t>
+              <a:t>6/25/2013</a:t>
             </a:fld>
             <a:endParaRPr lang="en-US"/>
           </a:p>
@@ -7119,6 +7119,13 @@
   <p:clrMapOvr>
     <a:masterClrMapping/>
   </p:clrMapOvr>
+  <p:timing>
+    <p:tnLst>
+      <p:par>
+        <p:cTn id="1" dur="indefinite" restart="never" nodeType="tmRoot"/>
+      </p:par>
+    </p:tnLst>
+  </p:timing>
 </p:sld>
 </file>
 
@@ -7306,11 +7313,7 @@
             </a:br>
             <a:r>
               <a:rPr lang="en-US" dirty="0"/>
-              <a:t>Demo </a:t>
-            </a:r>
-            <a:r>
-              <a:rPr lang="en-US" dirty="0"/>
-              <a:t>t</a:t>
+              <a:t>Demo t</a:t>
             </a:r>
             <a:r>
               <a:rPr lang="en-US" dirty="0" smtClean="0"/>
@@ -7373,6 +7376,13 @@
   <p:clrMapOvr>
     <a:masterClrMapping/>
   </p:clrMapOvr>
+  <p:timing>
+    <p:tnLst>
+      <p:par>
+        <p:cTn id="1" dur="indefinite" restart="never" nodeType="tmRoot"/>
+      </p:par>
+    </p:tnLst>
+  </p:timing>
 </p:sld>
 </file>
 
@@ -7607,6 +7617,13 @@
   <p:clrMapOvr>
     <a:masterClrMapping/>
   </p:clrMapOvr>
+  <p:timing>
+    <p:tnLst>
+      <p:par>
+        <p:cTn id="1" dur="indefinite" restart="never" nodeType="tmRoot"/>
+      </p:par>
+    </p:tnLst>
+  </p:timing>
 </p:sld>
 </file>
 
@@ -7663,7 +7680,7 @@
         <p:spPr/>
         <p:txBody>
           <a:bodyPr>
-            <a:normAutofit/>
+            <a:normAutofit fontScale="85000" lnSpcReduction="20000"/>
           </a:bodyPr>
           <a:lstStyle/>
           <a:p>
@@ -7695,13 +7712,8 @@
             <a:pPr lvl="1"/>
             <a:r>
               <a:rPr lang="en-US" dirty="0" smtClean="0"/>
-              <a:t>Check out Anders </a:t>
-            </a:r>
-            <a:r>
-              <a:rPr lang="en-US" dirty="0" smtClean="0"/>
-              <a:t>Demo Video </a:t>
-            </a:r>
-            <a:endParaRPr lang="en-US" dirty="0" smtClean="0"/>
+              <a:t>Check out Anders Demo Video </a:t>
+            </a:r>
           </a:p>
           <a:p>
             <a:r>
@@ -7710,23 +7722,14 @@
             </a:r>
             <a:r>
               <a:rPr lang="en-US" dirty="0" smtClean="0"/>
-              <a:t> </a:t>
-            </a:r>
+              <a:t> Course </a:t>
+            </a:r>
+          </a:p>
+          <a:p>
+            <a:pPr lvl="1"/>
             <a:r>
               <a:rPr lang="en-US" dirty="0" smtClean="0"/>
-              <a:t>Course </a:t>
-            </a:r>
-            <a:endParaRPr lang="en-US" dirty="0" smtClean="0"/>
-          </a:p>
-          <a:p>
-            <a:pPr lvl="1"/>
-            <a:r>
-              <a:rPr lang="en-US" dirty="0" smtClean="0"/>
-              <a:t>by </a:t>
-            </a:r>
-            <a:r>
-              <a:rPr lang="en-US" dirty="0" smtClean="0"/>
-              <a:t>Dan </a:t>
+              <a:t>by Dan </a:t>
             </a:r>
             <a:r>
               <a:rPr lang="en-US" dirty="0" err="1" smtClean="0"/>
@@ -7783,6 +7786,40 @@
             <a:r>
               <a:rPr lang="en-US" dirty="0"/>
               <a:t>http://channel9.msdn.com/Events/TechEd/NorthAmerica/2013/DEV-B203 </a:t>
+            </a:r>
+            <a:endParaRPr lang="en-US" dirty="0" smtClean="0"/>
+          </a:p>
+          <a:p>
+            <a:r>
+              <a:rPr lang="en-US" dirty="0" err="1"/>
+              <a:t>TypeScript</a:t>
+            </a:r>
+            <a:r>
+              <a:rPr lang="en-US" dirty="0"/>
+              <a:t>: Add Productivity and Manageability to your JavaScript </a:t>
+            </a:r>
+            <a:r>
+              <a:rPr lang="en-US" dirty="0" smtClean="0"/>
+              <a:t>Apps</a:t>
+            </a:r>
+          </a:p>
+          <a:p>
+            <a:pPr lvl="1"/>
+            <a:r>
+              <a:rPr lang="en-US" dirty="0" smtClean="0"/>
+              <a:t>By Shayne </a:t>
+            </a:r>
+            <a:r>
+              <a:rPr lang="en-US" dirty="0"/>
+              <a:t>Boyer</a:t>
+            </a:r>
+            <a:endParaRPr lang="en-US" dirty="0" smtClean="0"/>
+          </a:p>
+          <a:p>
+            <a:pPr lvl="1"/>
+            <a:r>
+              <a:rPr lang="en-US" dirty="0"/>
+              <a:t>http://msdn.microsoft.com/en-us/magazine/jj870740.aspx</a:t>
             </a:r>
             <a:endParaRPr lang="en-US" dirty="0" smtClean="0"/>
           </a:p>
@@ -8058,7 +8095,6 @@
               <a:rPr lang="en-US" dirty="0" smtClean="0"/>
               <a:t>Application Development Manager at Microsoft</a:t>
             </a:r>
-            <a:endParaRPr lang="en-US" dirty="0" smtClean="0"/>
           </a:p>
           <a:p>
             <a:r>
@@ -8502,6 +8538,13 @@
   <p:clrMapOvr>
     <a:masterClrMapping/>
   </p:clrMapOvr>
+  <p:timing>
+    <p:tnLst>
+      <p:par>
+        <p:cTn id="1" dur="indefinite" restart="never" nodeType="tmRoot"/>
+      </p:par>
+    </p:tnLst>
+  </p:timing>
 </p:sld>
 </file>
 
@@ -8604,6 +8647,13 @@
   <p:clrMapOvr>
     <a:masterClrMapping/>
   </p:clrMapOvr>
+  <p:timing>
+    <p:tnLst>
+      <p:par>
+        <p:cTn id="1" dur="indefinite" restart="never" nodeType="tmRoot"/>
+      </p:par>
+    </p:tnLst>
+  </p:timing>
 </p:sld>
 </file>
 
@@ -8850,15 +8900,7 @@
           <a:p>
             <a:r>
               <a:rPr lang="en-US" dirty="0" smtClean="0"/>
-              <a:t>DART </a:t>
-            </a:r>
-            <a:r>
-              <a:rPr lang="en-US" dirty="0" smtClean="0"/>
-              <a:t>- http://</a:t>
-            </a:r>
-            <a:r>
-              <a:rPr lang="en-US" dirty="0" smtClean="0"/>
-              <a:t>www.dartlang.org</a:t>
+              <a:t>DART - http://www.dartlang.org</a:t>
             </a:r>
           </a:p>
           <a:p>
@@ -8867,7 +8909,6 @@
               <a:rPr lang="en-US" dirty="0" smtClean="0"/>
               <a:t>Breaks from the way that JavaScript does things</a:t>
             </a:r>
-            <a:endParaRPr lang="en-US" dirty="0" smtClean="0"/>
           </a:p>
           <a:p>
             <a:r>
@@ -8876,11 +8917,7 @@
             </a:r>
             <a:r>
               <a:rPr lang="en-US" dirty="0" smtClean="0"/>
-              <a:t> - http://</a:t>
-            </a:r>
-            <a:r>
-              <a:rPr lang="en-US" dirty="0" smtClean="0"/>
-              <a:t>coffeescript.org</a:t>
+              <a:t> - http://coffeescript.org</a:t>
             </a:r>
           </a:p>
           <a:p>
@@ -8889,7 +8926,6 @@
               <a:rPr lang="en-US" dirty="0" smtClean="0"/>
               <a:t>Ruby flavor of JavaScript</a:t>
             </a:r>
-            <a:endParaRPr lang="en-US" dirty="0" smtClean="0"/>
           </a:p>
           <a:p>
             <a:endParaRPr lang="en-US" dirty="0"/>
@@ -9064,6 +9100,13 @@
   <p:clrMapOvr>
     <a:masterClrMapping/>
   </p:clrMapOvr>
+  <p:timing>
+    <p:tnLst>
+      <p:par>
+        <p:cTn id="1" dur="indefinite" restart="never" nodeType="tmRoot"/>
+      </p:par>
+    </p:tnLst>
+  </p:timing>
 </p:sld>
 </file>
 

</xml_diff>

<commit_message>
fix bug in jquery demo, added vs 2010 install instructions
</commit_message>
<xml_diff>
--- a/20130625_TypeScript.pptx
+++ b/20130625_TypeScript.pptx
@@ -5,7 +5,7 @@
     <p:sldMasterId id="2147483684" r:id="rId1"/>
   </p:sldMasterIdLst>
   <p:notesMasterIdLst>
-    <p:notesMasterId r:id="rId19"/>
+    <p:notesMasterId r:id="rId20"/>
   </p:notesMasterIdLst>
   <p:sldIdLst>
     <p:sldId id="256" r:id="rId2"/>
@@ -19,12 +19,13 @@
     <p:sldId id="371" r:id="rId10"/>
     <p:sldId id="364" r:id="rId11"/>
     <p:sldId id="361" r:id="rId12"/>
-    <p:sldId id="375" r:id="rId13"/>
-    <p:sldId id="367" r:id="rId14"/>
-    <p:sldId id="369" r:id="rId15"/>
-    <p:sldId id="363" r:id="rId16"/>
-    <p:sldId id="358" r:id="rId17"/>
-    <p:sldId id="261" r:id="rId18"/>
+    <p:sldId id="376" r:id="rId13"/>
+    <p:sldId id="375" r:id="rId14"/>
+    <p:sldId id="367" r:id="rId15"/>
+    <p:sldId id="369" r:id="rId16"/>
+    <p:sldId id="363" r:id="rId17"/>
+    <p:sldId id="358" r:id="rId18"/>
+    <p:sldId id="261" r:id="rId19"/>
   </p:sldIdLst>
   <p:sldSz cx="9144000" cy="6858000" type="screen4x3"/>
   <p:notesSz cx="6858000" cy="9144000"/>
@@ -224,7 +225,7 @@
           <a:p>
             <a:fld id="{6EBE45C2-1147-4836-8E0B-E6D95AAC8987}" type="datetimeFigureOut">
               <a:rPr lang="en-US" smtClean="0"/>
-              <a:t>6/25/2013</a:t>
+              <a:t>6/26/2013</a:t>
             </a:fld>
             <a:endParaRPr lang="en-US"/>
           </a:p>
@@ -1009,7 +1010,7 @@
             <a:fld id="{125EDE23-284B-4032-BB13-15D18E5884FA}" type="datetimeFigureOut">
               <a:rPr lang="en-US" smtClean="0"/>
               <a:pPr/>
-              <a:t>6/25/2013</a:t>
+              <a:t>6/26/2013</a:t>
             </a:fld>
             <a:endParaRPr lang="en-US"/>
           </a:p>
@@ -1111,7 +1112,7 @@
           </a:ln>
           <a:extLst>
             <a:ext uri="{91240B29-F687-4f45-9708-019B960494DF}">
-              <a14:hiddenLine xmlns:a14="http://schemas.microsoft.com/office/drawing/2010/main" xmlns="" w="9525">
+              <a14:hiddenLine xmlns="" xmlns:a14="http://schemas.microsoft.com/office/drawing/2010/main" w="9525">
                 <a:solidFill>
                   <a:srgbClr val="000000"/>
                 </a:solidFill>
@@ -1166,7 +1167,7 @@
           </a:ln>
           <a:extLst>
             <a:ext uri="{91240B29-F687-4f45-9708-019B960494DF}">
-              <a14:hiddenLine xmlns:a14="http://schemas.microsoft.com/office/drawing/2010/main" xmlns="" w="9525">
+              <a14:hiddenLine xmlns="" xmlns:a14="http://schemas.microsoft.com/office/drawing/2010/main" w="9525">
                 <a:solidFill>
                   <a:srgbClr val="000000"/>
                 </a:solidFill>
@@ -1422,7 +1423,7 @@
             <a:fld id="{125EDE23-284B-4032-BB13-15D18E5884FA}" type="datetimeFigureOut">
               <a:rPr lang="en-US" smtClean="0"/>
               <a:pPr/>
-              <a:t>6/25/2013</a:t>
+              <a:t>6/26/2013</a:t>
             </a:fld>
             <a:endParaRPr lang="en-US"/>
           </a:p>
@@ -1672,7 +1673,7 @@
             <a:fld id="{125EDE23-284B-4032-BB13-15D18E5884FA}" type="datetimeFigureOut">
               <a:rPr lang="en-US" smtClean="0"/>
               <a:pPr/>
-              <a:t>6/25/2013</a:t>
+              <a:t>6/26/2013</a:t>
             </a:fld>
             <a:endParaRPr lang="en-US"/>
           </a:p>
@@ -2214,7 +2215,7 @@
             <a:fld id="{125EDE23-284B-4032-BB13-15D18E5884FA}" type="datetimeFigureOut">
               <a:rPr lang="en-US" smtClean="0"/>
               <a:pPr/>
-              <a:t>6/25/2013</a:t>
+              <a:t>6/26/2013</a:t>
             </a:fld>
             <a:endParaRPr lang="en-US"/>
           </a:p>
@@ -2464,7 +2465,7 @@
             <a:fld id="{125EDE23-284B-4032-BB13-15D18E5884FA}" type="datetimeFigureOut">
               <a:rPr lang="en-US" smtClean="0"/>
               <a:pPr/>
-              <a:t>6/25/2013</a:t>
+              <a:t>6/26/2013</a:t>
             </a:fld>
             <a:endParaRPr lang="en-US"/>
           </a:p>
@@ -2998,7 +2999,7 @@
             <a:fld id="{125EDE23-284B-4032-BB13-15D18E5884FA}" type="datetimeFigureOut">
               <a:rPr lang="en-US" smtClean="0"/>
               <a:pPr/>
-              <a:t>6/25/2013</a:t>
+              <a:t>6/26/2013</a:t>
             </a:fld>
             <a:endParaRPr lang="en-US"/>
           </a:p>
@@ -3297,7 +3298,7 @@
             <a:fld id="{125EDE23-284B-4032-BB13-15D18E5884FA}" type="datetimeFigureOut">
               <a:rPr lang="en-US" smtClean="0"/>
               <a:pPr/>
-              <a:t>6/25/2013</a:t>
+              <a:t>6/26/2013</a:t>
             </a:fld>
             <a:endParaRPr lang="en-US"/>
           </a:p>
@@ -3473,7 +3474,7 @@
             <a:fld id="{125EDE23-284B-4032-BB13-15D18E5884FA}" type="datetimeFigureOut">
               <a:rPr lang="en-US" smtClean="0"/>
               <a:pPr/>
-              <a:t>6/25/2013</a:t>
+              <a:t>6/26/2013</a:t>
             </a:fld>
             <a:endParaRPr lang="en-US"/>
           </a:p>
@@ -3655,7 +3656,7 @@
             <a:fld id="{125EDE23-284B-4032-BB13-15D18E5884FA}" type="datetimeFigureOut">
               <a:rPr lang="en-US" smtClean="0"/>
               <a:pPr/>
-              <a:t>6/25/2013</a:t>
+              <a:t>6/26/2013</a:t>
             </a:fld>
             <a:endParaRPr lang="en-US"/>
           </a:p>
@@ -3842,7 +3843,7 @@
             <a:fld id="{125EDE23-284B-4032-BB13-15D18E5884FA}" type="datetimeFigureOut">
               <a:rPr lang="en-US" smtClean="0"/>
               <a:pPr/>
-              <a:t>6/25/2013</a:t>
+              <a:t>6/26/2013</a:t>
             </a:fld>
             <a:endParaRPr lang="en-US"/>
           </a:p>
@@ -4100,7 +4101,7 @@
             <a:fld id="{125EDE23-284B-4032-BB13-15D18E5884FA}" type="datetimeFigureOut">
               <a:rPr lang="en-US" smtClean="0"/>
               <a:pPr/>
-              <a:t>6/25/2013</a:t>
+              <a:t>6/26/2013</a:t>
             </a:fld>
             <a:endParaRPr lang="en-US"/>
           </a:p>
@@ -4404,7 +4405,7 @@
             <a:fld id="{125EDE23-284B-4032-BB13-15D18E5884FA}" type="datetimeFigureOut">
               <a:rPr lang="en-US" smtClean="0"/>
               <a:pPr/>
-              <a:t>6/25/2013</a:t>
+              <a:t>6/26/2013</a:t>
             </a:fld>
             <a:endParaRPr lang="en-US"/>
           </a:p>
@@ -4848,7 +4849,7 @@
             <a:fld id="{125EDE23-284B-4032-BB13-15D18E5884FA}" type="datetimeFigureOut">
               <a:rPr lang="en-US" smtClean="0"/>
               <a:pPr/>
-              <a:t>6/25/2013</a:t>
+              <a:t>6/26/2013</a:t>
             </a:fld>
             <a:endParaRPr lang="en-US"/>
           </a:p>
@@ -4968,7 +4969,7 @@
             <a:fld id="{125EDE23-284B-4032-BB13-15D18E5884FA}" type="datetimeFigureOut">
               <a:rPr lang="en-US" smtClean="0"/>
               <a:pPr/>
-              <a:t>6/25/2013</a:t>
+              <a:t>6/26/2013</a:t>
             </a:fld>
             <a:endParaRPr lang="en-US"/>
           </a:p>
@@ -5065,7 +5066,7 @@
             <a:fld id="{125EDE23-284B-4032-BB13-15D18E5884FA}" type="datetimeFigureOut">
               <a:rPr lang="en-US" smtClean="0"/>
               <a:pPr/>
-              <a:t>6/25/2013</a:t>
+              <a:t>6/26/2013</a:t>
             </a:fld>
             <a:endParaRPr lang="en-US"/>
           </a:p>
@@ -5350,7 +5351,7 @@
             <a:fld id="{125EDE23-284B-4032-BB13-15D18E5884FA}" type="datetimeFigureOut">
               <a:rPr lang="en-US" smtClean="0"/>
               <a:pPr/>
-              <a:t>6/25/2013</a:t>
+              <a:t>6/26/2013</a:t>
             </a:fld>
             <a:endParaRPr lang="en-US"/>
           </a:p>
@@ -5643,7 +5644,7 @@
             <a:fld id="{125EDE23-284B-4032-BB13-15D18E5884FA}" type="datetimeFigureOut">
               <a:rPr lang="en-US" smtClean="0"/>
               <a:pPr/>
-              <a:t>6/25/2013</a:t>
+              <a:t>6/26/2013</a:t>
             </a:fld>
             <a:endParaRPr lang="en-US"/>
           </a:p>
@@ -6169,7 +6170,7 @@
             <a:fld id="{125EDE23-284B-4032-BB13-15D18E5884FA}" type="datetimeFigureOut">
               <a:rPr lang="en-US" smtClean="0"/>
               <a:pPr/>
-              <a:t>6/25/2013</a:t>
+              <a:t>6/26/2013</a:t>
             </a:fld>
             <a:endParaRPr lang="en-US"/>
           </a:p>
@@ -7162,8 +7163,12 @@
           <a:lstStyle/>
           <a:p>
             <a:r>
+              <a:rPr lang="en-US" dirty="0" err="1" smtClean="0"/>
+              <a:t>TypeScript</a:t>
+            </a:r>
+            <a:r>
               <a:rPr lang="en-US" dirty="0" smtClean="0"/>
-              <a:t>Demos:</a:t>
+              <a:t> in VS 2010</a:t>
             </a:r>
             <a:endParaRPr lang="en-US" dirty="0"/>
           </a:p>
@@ -7186,65 +7191,623 @@
           <a:p>
             <a:r>
               <a:rPr lang="en-US" dirty="0" smtClean="0"/>
-              <a:t>To Be Continued …</a:t>
+              <a:t>Not supported by Microsoft, use at own risk</a:t>
             </a:r>
           </a:p>
           <a:p>
             <a:r>
               <a:rPr lang="en-US" dirty="0" smtClean="0"/>
-              <a:t>The </a:t>
-            </a:r>
-            <a:r>
-              <a:rPr lang="en-US" dirty="0" err="1" smtClean="0"/>
+              <a:t>Here are instructions from Jim Moreno, there are a number of other techniques on the web</a:t>
+            </a:r>
+            <a:endParaRPr lang="en-US" dirty="0"/>
+          </a:p>
+        </p:txBody>
+      </p:sp>
+      <p:sp>
+        <p:nvSpPr>
+          <p:cNvPr id="4" name="Rectangle 3"/>
+          <p:cNvSpPr/>
+          <p:nvPr/>
+        </p:nvSpPr>
+        <p:spPr>
+          <a:xfrm>
+            <a:off x="2362200" y="2895600"/>
+            <a:ext cx="5875867" cy="3606115"/>
+          </a:xfrm>
+          <a:prstGeom prst="rect">
+            <a:avLst/>
+          </a:prstGeom>
+        </p:spPr>
+        <p:txBody>
+          <a:bodyPr wrap="square">
+            <a:spAutoFit/>
+          </a:bodyPr>
+          <a:lstStyle/>
+          <a:p>
+            <a:pPr>
+              <a:lnSpc>
+                <a:spcPts val="1260"/>
+              </a:lnSpc>
+              <a:spcBef>
+                <a:spcPts val="525"/>
+              </a:spcBef>
+              <a:spcAft>
+                <a:spcPts val="600"/>
+              </a:spcAft>
+            </a:pPr>
+            <a:r>
+              <a:rPr lang="en-US" sz="1050" dirty="0">
+                <a:solidFill>
+                  <a:srgbClr val="333333"/>
+                </a:solidFill>
+                <a:latin typeface="Verdana" panose="020B0604030504040204" pitchFamily="34" charset="0"/>
+                <a:ea typeface="Calibri" panose="020F0502020204030204" pitchFamily="34" charset="0"/>
+                <a:cs typeface="Times New Roman" panose="02020603050405020304" pitchFamily="18" charset="0"/>
+              </a:rPr>
+              <a:t>The following steps is how to install </a:t>
+            </a:r>
+            <a:r>
+              <a:rPr lang="en-US" sz="1050" dirty="0" err="1">
+                <a:solidFill>
+                  <a:srgbClr val="333333"/>
+                </a:solidFill>
+                <a:latin typeface="Verdana" panose="020B0604030504040204" pitchFamily="34" charset="0"/>
+                <a:ea typeface="Calibri" panose="020F0502020204030204" pitchFamily="34" charset="0"/>
+                <a:cs typeface="Times New Roman" panose="02020603050405020304" pitchFamily="18" charset="0"/>
+              </a:rPr>
               <a:t>TypeScript</a:t>
             </a:r>
             <a:r>
-              <a:rPr lang="en-US" dirty="0" smtClean="0"/>
-              <a:t> Type System</a:t>
-            </a:r>
-          </a:p>
-          <a:p>
-            <a:r>
-              <a:rPr lang="en-US" dirty="0" smtClean="0"/>
-              <a:t>Structure in JavaScript</a:t>
-            </a:r>
-          </a:p>
-          <a:p>
-            <a:r>
-              <a:rPr lang="en-US" dirty="0" smtClean="0"/>
-              <a:t>Debugging in JavaScript</a:t>
-            </a:r>
-          </a:p>
-          <a:p>
-            <a:r>
-              <a:rPr lang="en-US" dirty="0" err="1" smtClean="0"/>
+              <a:rPr lang="en-US" sz="1050" dirty="0">
+                <a:solidFill>
+                  <a:srgbClr val="333333"/>
+                </a:solidFill>
+                <a:latin typeface="Verdana" panose="020B0604030504040204" pitchFamily="34" charset="0"/>
+                <a:ea typeface="Calibri" panose="020F0502020204030204" pitchFamily="34" charset="0"/>
+                <a:cs typeface="Times New Roman" panose="02020603050405020304" pitchFamily="18" charset="0"/>
+              </a:rPr>
+              <a:t> into Visual Studio 2010</a:t>
+            </a:r>
+            <a:endParaRPr lang="en-US" sz="1400" dirty="0">
+              <a:latin typeface="Calibri" panose="020F0502020204030204" pitchFamily="34" charset="0"/>
+              <a:ea typeface="Calibri" panose="020F0502020204030204" pitchFamily="34" charset="0"/>
+              <a:cs typeface="Times New Roman" panose="02020603050405020304" pitchFamily="18" charset="0"/>
+            </a:endParaRPr>
+          </a:p>
+          <a:p>
+            <a:pPr marL="342900" marR="0" lvl="0" indent="-342900">
+              <a:lnSpc>
+                <a:spcPts val="1260"/>
+              </a:lnSpc>
+              <a:spcBef>
+                <a:spcPts val="525"/>
+              </a:spcBef>
+              <a:spcAft>
+                <a:spcPts val="600"/>
+              </a:spcAft>
+              <a:buFont typeface="+mj-lt"/>
+              <a:buAutoNum type="arabicPeriod"/>
+            </a:pPr>
+            <a:r>
+              <a:rPr lang="en-US" sz="1050" dirty="0">
+                <a:solidFill>
+                  <a:srgbClr val="333333"/>
+                </a:solidFill>
+                <a:latin typeface="Verdana" panose="020B0604030504040204" pitchFamily="34" charset="0"/>
+                <a:ea typeface="Calibri" panose="020F0502020204030204" pitchFamily="34" charset="0"/>
+                <a:cs typeface="Times New Roman" panose="02020603050405020304" pitchFamily="18" charset="0"/>
+              </a:rPr>
+              <a:t>Download the installer package (most current is </a:t>
+            </a:r>
+            <a:r>
+              <a:rPr lang="en-US" sz="1050" u="sng" dirty="0">
+                <a:solidFill>
+                  <a:srgbClr val="333333"/>
+                </a:solidFill>
+                <a:latin typeface="Verdana" panose="020B0604030504040204" pitchFamily="34" charset="0"/>
+                <a:ea typeface="Calibri" panose="020F0502020204030204" pitchFamily="34" charset="0"/>
+                <a:cs typeface="Times New Roman" panose="02020603050405020304" pitchFamily="18" charset="0"/>
+                <a:hlinkClick r:id="rId2"/>
+              </a:rPr>
+              <a:t>TypeScriptSetup.0.9.0.msi</a:t>
+            </a:r>
+            <a:r>
+              <a:rPr lang="en-US" sz="1050" dirty="0">
+                <a:solidFill>
+                  <a:srgbClr val="333333"/>
+                </a:solidFill>
+                <a:latin typeface="Verdana" panose="020B0604030504040204" pitchFamily="34" charset="0"/>
+                <a:ea typeface="Calibri" panose="020F0502020204030204" pitchFamily="34" charset="0"/>
+                <a:cs typeface="Times New Roman" panose="02020603050405020304" pitchFamily="18" charset="0"/>
+              </a:rPr>
+              <a:t>)</a:t>
+            </a:r>
+            <a:endParaRPr lang="en-US" sz="1400" dirty="0">
+              <a:latin typeface="Calibri" panose="020F0502020204030204" pitchFamily="34" charset="0"/>
+              <a:ea typeface="Calibri" panose="020F0502020204030204" pitchFamily="34" charset="0"/>
+              <a:cs typeface="Times New Roman" panose="02020603050405020304" pitchFamily="18" charset="0"/>
+            </a:endParaRPr>
+          </a:p>
+          <a:p>
+            <a:pPr marL="342900" marR="0" lvl="0" indent="-342900">
+              <a:lnSpc>
+                <a:spcPts val="1260"/>
+              </a:lnSpc>
+              <a:spcBef>
+                <a:spcPts val="525"/>
+              </a:spcBef>
+              <a:spcAft>
+                <a:spcPts val="600"/>
+              </a:spcAft>
+              <a:buFont typeface="+mj-lt"/>
+              <a:buAutoNum type="arabicPeriod"/>
+            </a:pPr>
+            <a:r>
+              <a:rPr lang="en-US" sz="1050" dirty="0">
+                <a:solidFill>
+                  <a:srgbClr val="333333"/>
+                </a:solidFill>
+                <a:latin typeface="Verdana" panose="020B0604030504040204" pitchFamily="34" charset="0"/>
+                <a:ea typeface="Calibri" panose="020F0502020204030204" pitchFamily="34" charset="0"/>
+                <a:cs typeface="Times New Roman" panose="02020603050405020304" pitchFamily="18" charset="0"/>
+              </a:rPr>
+              <a:t>Run the installer package to install the </a:t>
+            </a:r>
+            <a:r>
+              <a:rPr lang="en-US" sz="1050" dirty="0" err="1">
+                <a:solidFill>
+                  <a:srgbClr val="333333"/>
+                </a:solidFill>
+                <a:latin typeface="Verdana" panose="020B0604030504040204" pitchFamily="34" charset="0"/>
+                <a:ea typeface="Calibri" panose="020F0502020204030204" pitchFamily="34" charset="0"/>
+                <a:cs typeface="Times New Roman" panose="02020603050405020304" pitchFamily="18" charset="0"/>
+              </a:rPr>
               <a:t>TypeScript</a:t>
             </a:r>
             <a:r>
-              <a:rPr lang="en-US" dirty="0" smtClean="0"/>
-              <a:t> with 3</a:t>
-            </a:r>
-            <a:r>
-              <a:rPr lang="en-US" baseline="30000" dirty="0" smtClean="0"/>
-              <a:t>rd</a:t>
-            </a:r>
-            <a:r>
-              <a:rPr lang="en-US" dirty="0" smtClean="0"/>
-              <a:t> Party Libraries</a:t>
-            </a:r>
-          </a:p>
-          <a:p>
-            <a:endParaRPr lang="en-US" dirty="0" smtClean="0"/>
-          </a:p>
-          <a:p>
-            <a:endParaRPr lang="en-US" dirty="0"/>
+              <a:rPr lang="en-US" sz="1050" dirty="0">
+                <a:solidFill>
+                  <a:srgbClr val="333333"/>
+                </a:solidFill>
+                <a:latin typeface="Verdana" panose="020B0604030504040204" pitchFamily="34" charset="0"/>
+                <a:ea typeface="Calibri" panose="020F0502020204030204" pitchFamily="34" charset="0"/>
+                <a:cs typeface="Times New Roman" panose="02020603050405020304" pitchFamily="18" charset="0"/>
+              </a:rPr>
+              <a:t> compiler</a:t>
+            </a:r>
+            <a:endParaRPr lang="en-US" sz="1400" dirty="0">
+              <a:latin typeface="Calibri" panose="020F0502020204030204" pitchFamily="34" charset="0"/>
+              <a:ea typeface="Calibri" panose="020F0502020204030204" pitchFamily="34" charset="0"/>
+              <a:cs typeface="Times New Roman" panose="02020603050405020304" pitchFamily="18" charset="0"/>
+            </a:endParaRPr>
+          </a:p>
+          <a:p>
+            <a:pPr marL="342900" marR="0" lvl="0" indent="-342900">
+              <a:lnSpc>
+                <a:spcPts val="1260"/>
+              </a:lnSpc>
+              <a:spcBef>
+                <a:spcPts val="525"/>
+              </a:spcBef>
+              <a:spcAft>
+                <a:spcPts val="600"/>
+              </a:spcAft>
+              <a:buFont typeface="+mj-lt"/>
+              <a:buAutoNum type="arabicPeriod"/>
+            </a:pPr>
+            <a:r>
+              <a:rPr lang="en-US" sz="1050" dirty="0">
+                <a:solidFill>
+                  <a:srgbClr val="333333"/>
+                </a:solidFill>
+                <a:latin typeface="Verdana" panose="020B0604030504040204" pitchFamily="34" charset="0"/>
+                <a:ea typeface="Calibri" panose="020F0502020204030204" pitchFamily="34" charset="0"/>
+                <a:cs typeface="Times New Roman" panose="02020603050405020304" pitchFamily="18" charset="0"/>
+              </a:rPr>
+              <a:t>Extract the .</a:t>
+            </a:r>
+            <a:r>
+              <a:rPr lang="en-US" sz="1050" dirty="0" err="1">
+                <a:solidFill>
+                  <a:srgbClr val="333333"/>
+                </a:solidFill>
+                <a:latin typeface="Verdana" panose="020B0604030504040204" pitchFamily="34" charset="0"/>
+                <a:ea typeface="Calibri" panose="020F0502020204030204" pitchFamily="34" charset="0"/>
+                <a:cs typeface="Times New Roman" panose="02020603050405020304" pitchFamily="18" charset="0"/>
+              </a:rPr>
+              <a:t>msi</a:t>
+            </a:r>
+            <a:r>
+              <a:rPr lang="en-US" sz="1050" dirty="0">
+                <a:solidFill>
+                  <a:srgbClr val="333333"/>
+                </a:solidFill>
+                <a:latin typeface="Verdana" panose="020B0604030504040204" pitchFamily="34" charset="0"/>
+                <a:ea typeface="Calibri" panose="020F0502020204030204" pitchFamily="34" charset="0"/>
+                <a:cs typeface="Times New Roman" panose="02020603050405020304" pitchFamily="18" charset="0"/>
+              </a:rPr>
+              <a:t> using 7zip</a:t>
+            </a:r>
+            <a:endParaRPr lang="en-US" sz="1400" dirty="0">
+              <a:latin typeface="Calibri" panose="020F0502020204030204" pitchFamily="34" charset="0"/>
+              <a:ea typeface="Calibri" panose="020F0502020204030204" pitchFamily="34" charset="0"/>
+              <a:cs typeface="Times New Roman" panose="02020603050405020304" pitchFamily="18" charset="0"/>
+            </a:endParaRPr>
+          </a:p>
+          <a:p>
+            <a:pPr marL="342900" marR="0" lvl="0" indent="-342900">
+              <a:lnSpc>
+                <a:spcPts val="1260"/>
+              </a:lnSpc>
+              <a:spcBef>
+                <a:spcPts val="525"/>
+              </a:spcBef>
+              <a:spcAft>
+                <a:spcPts val="600"/>
+              </a:spcAft>
+              <a:buFont typeface="+mj-lt"/>
+              <a:buAutoNum type="arabicPeriod"/>
+            </a:pPr>
+            <a:r>
+              <a:rPr lang="en-US" sz="1050" dirty="0">
+                <a:solidFill>
+                  <a:srgbClr val="333333"/>
+                </a:solidFill>
+                <a:latin typeface="Verdana" panose="020B0604030504040204" pitchFamily="34" charset="0"/>
+                <a:ea typeface="Calibri" panose="020F0502020204030204" pitchFamily="34" charset="0"/>
+                <a:cs typeface="Times New Roman" panose="02020603050405020304" pitchFamily="18" charset="0"/>
+              </a:rPr>
+              <a:t>Copy or rename the extracted </a:t>
+            </a:r>
+            <a:r>
+              <a:rPr lang="en-US" sz="1050" dirty="0" err="1">
+                <a:solidFill>
+                  <a:srgbClr val="333333"/>
+                </a:solidFill>
+                <a:latin typeface="Verdana" panose="020B0604030504040204" pitchFamily="34" charset="0"/>
+                <a:ea typeface="Calibri" panose="020F0502020204030204" pitchFamily="34" charset="0"/>
+                <a:cs typeface="Times New Roman" panose="02020603050405020304" pitchFamily="18" charset="0"/>
+              </a:rPr>
+              <a:t>TypeScriptLS.vsix_File</a:t>
+            </a:r>
+            <a:r>
+              <a:rPr lang="en-US" sz="1050" dirty="0">
+                <a:solidFill>
+                  <a:srgbClr val="333333"/>
+                </a:solidFill>
+                <a:latin typeface="Verdana" panose="020B0604030504040204" pitchFamily="34" charset="0"/>
+                <a:ea typeface="Calibri" panose="020F0502020204030204" pitchFamily="34" charset="0"/>
+                <a:cs typeface="Times New Roman" panose="02020603050405020304" pitchFamily="18" charset="0"/>
+              </a:rPr>
+              <a:t> to </a:t>
+            </a:r>
+            <a:r>
+              <a:rPr lang="en-US" sz="1050" dirty="0" err="1">
+                <a:solidFill>
+                  <a:srgbClr val="333333"/>
+                </a:solidFill>
+                <a:latin typeface="Verdana" panose="020B0604030504040204" pitchFamily="34" charset="0"/>
+                <a:ea typeface="Calibri" panose="020F0502020204030204" pitchFamily="34" charset="0"/>
+                <a:cs typeface="Times New Roman" panose="02020603050405020304" pitchFamily="18" charset="0"/>
+              </a:rPr>
+              <a:t>TypeScriptLS.vsix</a:t>
+            </a:r>
+            <a:endParaRPr lang="en-US" sz="1400" dirty="0">
+              <a:latin typeface="Calibri" panose="020F0502020204030204" pitchFamily="34" charset="0"/>
+              <a:ea typeface="Calibri" panose="020F0502020204030204" pitchFamily="34" charset="0"/>
+              <a:cs typeface="Times New Roman" panose="02020603050405020304" pitchFamily="18" charset="0"/>
+            </a:endParaRPr>
+          </a:p>
+          <a:p>
+            <a:pPr marL="342900" marR="0" lvl="0" indent="-342900">
+              <a:lnSpc>
+                <a:spcPts val="1260"/>
+              </a:lnSpc>
+              <a:spcBef>
+                <a:spcPts val="525"/>
+              </a:spcBef>
+              <a:spcAft>
+                <a:spcPts val="600"/>
+              </a:spcAft>
+              <a:buFont typeface="+mj-lt"/>
+              <a:buAutoNum type="arabicPeriod"/>
+            </a:pPr>
+            <a:r>
+              <a:rPr lang="en-US" sz="1050" dirty="0">
+                <a:solidFill>
+                  <a:srgbClr val="333333"/>
+                </a:solidFill>
+                <a:latin typeface="Verdana" panose="020B0604030504040204" pitchFamily="34" charset="0"/>
+                <a:ea typeface="Calibri" panose="020F0502020204030204" pitchFamily="34" charset="0"/>
+                <a:cs typeface="Times New Roman" panose="02020603050405020304" pitchFamily="18" charset="0"/>
+              </a:rPr>
+              <a:t>Run the .</a:t>
+            </a:r>
+            <a:r>
+              <a:rPr lang="en-US" sz="1050" dirty="0" err="1">
+                <a:solidFill>
+                  <a:srgbClr val="333333"/>
+                </a:solidFill>
+                <a:latin typeface="Verdana" panose="020B0604030504040204" pitchFamily="34" charset="0"/>
+                <a:ea typeface="Calibri" panose="020F0502020204030204" pitchFamily="34" charset="0"/>
+                <a:cs typeface="Times New Roman" panose="02020603050405020304" pitchFamily="18" charset="0"/>
+              </a:rPr>
+              <a:t>vsix</a:t>
+            </a:r>
+            <a:r>
+              <a:rPr lang="en-US" sz="1050" dirty="0">
+                <a:solidFill>
+                  <a:srgbClr val="333333"/>
+                </a:solidFill>
+                <a:latin typeface="Verdana" panose="020B0604030504040204" pitchFamily="34" charset="0"/>
+                <a:ea typeface="Calibri" panose="020F0502020204030204" pitchFamily="34" charset="0"/>
+                <a:cs typeface="Times New Roman" panose="02020603050405020304" pitchFamily="18" charset="0"/>
+              </a:rPr>
+              <a:t> file</a:t>
+            </a:r>
+            <a:endParaRPr lang="en-US" sz="1400" dirty="0">
+              <a:latin typeface="Calibri" panose="020F0502020204030204" pitchFamily="34" charset="0"/>
+              <a:ea typeface="Calibri" panose="020F0502020204030204" pitchFamily="34" charset="0"/>
+              <a:cs typeface="Times New Roman" panose="02020603050405020304" pitchFamily="18" charset="0"/>
+            </a:endParaRPr>
+          </a:p>
+          <a:p>
+            <a:pPr marL="342900" marR="0" lvl="0" indent="-342900">
+              <a:lnSpc>
+                <a:spcPts val="1260"/>
+              </a:lnSpc>
+              <a:spcBef>
+                <a:spcPts val="525"/>
+              </a:spcBef>
+              <a:spcAft>
+                <a:spcPts val="600"/>
+              </a:spcAft>
+              <a:buFont typeface="+mj-lt"/>
+              <a:buAutoNum type="arabicPeriod"/>
+            </a:pPr>
+            <a:r>
+              <a:rPr lang="en-US" sz="1050" dirty="0">
+                <a:solidFill>
+                  <a:srgbClr val="333333"/>
+                </a:solidFill>
+                <a:latin typeface="Verdana" panose="020B0604030504040204" pitchFamily="34" charset="0"/>
+                <a:ea typeface="Calibri" panose="020F0502020204030204" pitchFamily="34" charset="0"/>
+                <a:cs typeface="Times New Roman" panose="02020603050405020304" pitchFamily="18" charset="0"/>
+              </a:rPr>
+              <a:t>The installer states it will install </a:t>
+            </a:r>
+            <a:r>
+              <a:rPr lang="en-US" sz="1050" dirty="0" err="1">
+                <a:solidFill>
+                  <a:srgbClr val="333333"/>
+                </a:solidFill>
+                <a:latin typeface="Verdana" panose="020B0604030504040204" pitchFamily="34" charset="0"/>
+                <a:ea typeface="Calibri" panose="020F0502020204030204" pitchFamily="34" charset="0"/>
+                <a:cs typeface="Times New Roman" panose="02020603050405020304" pitchFamily="18" charset="0"/>
+              </a:rPr>
+              <a:t>TypeScript</a:t>
+            </a:r>
+            <a:r>
+              <a:rPr lang="en-US" sz="1050" dirty="0">
+                <a:solidFill>
+                  <a:srgbClr val="333333"/>
+                </a:solidFill>
+                <a:latin typeface="Verdana" panose="020B0604030504040204" pitchFamily="34" charset="0"/>
+                <a:ea typeface="Calibri" panose="020F0502020204030204" pitchFamily="34" charset="0"/>
+                <a:cs typeface="Times New Roman" panose="02020603050405020304" pitchFamily="18" charset="0"/>
+              </a:rPr>
+              <a:t> support for VS 2010</a:t>
+            </a:r>
+            <a:endParaRPr lang="en-US" sz="1400" dirty="0">
+              <a:latin typeface="Calibri" panose="020F0502020204030204" pitchFamily="34" charset="0"/>
+              <a:ea typeface="Calibri" panose="020F0502020204030204" pitchFamily="34" charset="0"/>
+              <a:cs typeface="Times New Roman" panose="02020603050405020304" pitchFamily="18" charset="0"/>
+            </a:endParaRPr>
+          </a:p>
+          <a:p>
+            <a:pPr marL="342900" marR="0" lvl="0" indent="-342900">
+              <a:lnSpc>
+                <a:spcPts val="1260"/>
+              </a:lnSpc>
+              <a:spcBef>
+                <a:spcPts val="525"/>
+              </a:spcBef>
+              <a:spcAft>
+                <a:spcPts val="600"/>
+              </a:spcAft>
+              <a:buFont typeface="+mj-lt"/>
+              <a:buAutoNum type="arabicPeriod"/>
+            </a:pPr>
+            <a:r>
+              <a:rPr lang="en-US" sz="1050" dirty="0">
+                <a:solidFill>
+                  <a:srgbClr val="333333"/>
+                </a:solidFill>
+                <a:latin typeface="Verdana" panose="020B0604030504040204" pitchFamily="34" charset="0"/>
+                <a:ea typeface="Calibri" panose="020F0502020204030204" pitchFamily="34" charset="0"/>
+                <a:cs typeface="Times New Roman" panose="02020603050405020304" pitchFamily="18" charset="0"/>
+              </a:rPr>
+              <a:t>(Close and) Open Visual Studio 2010</a:t>
+            </a:r>
+            <a:endParaRPr lang="en-US" sz="1400" dirty="0">
+              <a:latin typeface="Calibri" panose="020F0502020204030204" pitchFamily="34" charset="0"/>
+              <a:ea typeface="Calibri" panose="020F0502020204030204" pitchFamily="34" charset="0"/>
+              <a:cs typeface="Times New Roman" panose="02020603050405020304" pitchFamily="18" charset="0"/>
+            </a:endParaRPr>
+          </a:p>
+          <a:p>
+            <a:pPr marL="342900" marR="0" lvl="0" indent="-342900">
+              <a:lnSpc>
+                <a:spcPts val="1260"/>
+              </a:lnSpc>
+              <a:spcBef>
+                <a:spcPts val="0"/>
+              </a:spcBef>
+              <a:spcAft>
+                <a:spcPts val="0"/>
+              </a:spcAft>
+              <a:buFont typeface="+mj-lt"/>
+              <a:buAutoNum type="arabicPeriod"/>
+            </a:pPr>
+            <a:r>
+              <a:rPr lang="en-US" sz="1050" dirty="0">
+                <a:solidFill>
+                  <a:srgbClr val="333333"/>
+                </a:solidFill>
+                <a:latin typeface="Verdana" panose="020B0604030504040204" pitchFamily="34" charset="0"/>
+                <a:ea typeface="Calibri" panose="020F0502020204030204" pitchFamily="34" charset="0"/>
+                <a:cs typeface="Times New Roman" panose="02020603050405020304" pitchFamily="18" charset="0"/>
+              </a:rPr>
+              <a:t>After successful installation, Visual Studio provides:</a:t>
+            </a:r>
+            <a:endParaRPr lang="en-US" sz="1400" dirty="0">
+              <a:latin typeface="Calibri" panose="020F0502020204030204" pitchFamily="34" charset="0"/>
+              <a:ea typeface="Calibri" panose="020F0502020204030204" pitchFamily="34" charset="0"/>
+              <a:cs typeface="Times New Roman" panose="02020603050405020304" pitchFamily="18" charset="0"/>
+            </a:endParaRPr>
+          </a:p>
+          <a:p>
+            <a:pPr marL="342900" marR="0" lvl="0" indent="-342900">
+              <a:lnSpc>
+                <a:spcPts val="1260"/>
+              </a:lnSpc>
+              <a:spcBef>
+                <a:spcPts val="525"/>
+              </a:spcBef>
+              <a:spcAft>
+                <a:spcPts val="600"/>
+              </a:spcAft>
+              <a:buFont typeface="Symbol" panose="05050102010706020507" pitchFamily="18" charset="2"/>
+              <a:buChar char=""/>
+            </a:pPr>
+            <a:r>
+              <a:rPr lang="en-US" sz="1050" dirty="0">
+                <a:solidFill>
+                  <a:srgbClr val="333333"/>
+                </a:solidFill>
+                <a:latin typeface="Verdana" panose="020B0604030504040204" pitchFamily="34" charset="0"/>
+                <a:ea typeface="Calibri" panose="020F0502020204030204" pitchFamily="34" charset="0"/>
+                <a:cs typeface="Times New Roman" panose="02020603050405020304" pitchFamily="18" charset="0"/>
+              </a:rPr>
+              <a:t>a new project type named “HTML Application with </a:t>
+            </a:r>
+            <a:r>
+              <a:rPr lang="en-US" sz="1050" dirty="0" err="1">
+                <a:solidFill>
+                  <a:srgbClr val="333333"/>
+                </a:solidFill>
+                <a:latin typeface="Verdana" panose="020B0604030504040204" pitchFamily="34" charset="0"/>
+                <a:ea typeface="Calibri" panose="020F0502020204030204" pitchFamily="34" charset="0"/>
+                <a:cs typeface="Times New Roman" panose="02020603050405020304" pitchFamily="18" charset="0"/>
+              </a:rPr>
+              <a:t>TypeScript</a:t>
+            </a:r>
+            <a:r>
+              <a:rPr lang="en-US" sz="1050" dirty="0">
+                <a:solidFill>
+                  <a:srgbClr val="333333"/>
+                </a:solidFill>
+                <a:latin typeface="Verdana" panose="020B0604030504040204" pitchFamily="34" charset="0"/>
+                <a:ea typeface="Calibri" panose="020F0502020204030204" pitchFamily="34" charset="0"/>
+                <a:cs typeface="Times New Roman" panose="02020603050405020304" pitchFamily="18" charset="0"/>
+              </a:rPr>
+              <a:t>”</a:t>
+            </a:r>
+            <a:endParaRPr lang="en-US" sz="1400" dirty="0">
+              <a:latin typeface="Calibri" panose="020F0502020204030204" pitchFamily="34" charset="0"/>
+              <a:ea typeface="Calibri" panose="020F0502020204030204" pitchFamily="34" charset="0"/>
+              <a:cs typeface="Times New Roman" panose="02020603050405020304" pitchFamily="18" charset="0"/>
+            </a:endParaRPr>
+          </a:p>
+          <a:p>
+            <a:pPr marL="342900" marR="0" lvl="0" indent="-342900">
+              <a:lnSpc>
+                <a:spcPts val="1260"/>
+              </a:lnSpc>
+              <a:spcBef>
+                <a:spcPts val="525"/>
+              </a:spcBef>
+              <a:spcAft>
+                <a:spcPts val="600"/>
+              </a:spcAft>
+              <a:buFont typeface="Symbol" panose="05050102010706020507" pitchFamily="18" charset="2"/>
+              <a:buChar char=""/>
+            </a:pPr>
+            <a:r>
+              <a:rPr lang="en-US" sz="1050" dirty="0">
+                <a:solidFill>
+                  <a:srgbClr val="333333"/>
+                </a:solidFill>
+                <a:latin typeface="Verdana" panose="020B0604030504040204" pitchFamily="34" charset="0"/>
+                <a:ea typeface="Calibri" panose="020F0502020204030204" pitchFamily="34" charset="0"/>
+                <a:cs typeface="Times New Roman" panose="02020603050405020304" pitchFamily="18" charset="0"/>
+              </a:rPr>
+              <a:t>a new item type named “</a:t>
+            </a:r>
+            <a:r>
+              <a:rPr lang="en-US" sz="1050" dirty="0" err="1">
+                <a:solidFill>
+                  <a:srgbClr val="333333"/>
+                </a:solidFill>
+                <a:latin typeface="Verdana" panose="020B0604030504040204" pitchFamily="34" charset="0"/>
+                <a:ea typeface="Calibri" panose="020F0502020204030204" pitchFamily="34" charset="0"/>
+                <a:cs typeface="Times New Roman" panose="02020603050405020304" pitchFamily="18" charset="0"/>
+              </a:rPr>
+              <a:t>TypeScript</a:t>
+            </a:r>
+            <a:r>
+              <a:rPr lang="en-US" sz="1050" dirty="0">
+                <a:solidFill>
+                  <a:srgbClr val="333333"/>
+                </a:solidFill>
+                <a:latin typeface="Verdana" panose="020B0604030504040204" pitchFamily="34" charset="0"/>
+                <a:ea typeface="Calibri" panose="020F0502020204030204" pitchFamily="34" charset="0"/>
+                <a:cs typeface="Times New Roman" panose="02020603050405020304" pitchFamily="18" charset="0"/>
+              </a:rPr>
+              <a:t> File”</a:t>
+            </a:r>
+            <a:endParaRPr lang="en-US" sz="1400" dirty="0">
+              <a:latin typeface="Calibri" panose="020F0502020204030204" pitchFamily="34" charset="0"/>
+              <a:ea typeface="Calibri" panose="020F0502020204030204" pitchFamily="34" charset="0"/>
+              <a:cs typeface="Times New Roman" panose="02020603050405020304" pitchFamily="18" charset="0"/>
+            </a:endParaRPr>
+          </a:p>
+          <a:p>
+            <a:pPr marL="228600" marR="0">
+              <a:lnSpc>
+                <a:spcPts val="1260"/>
+              </a:lnSpc>
+              <a:spcBef>
+                <a:spcPts val="0"/>
+              </a:spcBef>
+              <a:spcAft>
+                <a:spcPts val="0"/>
+              </a:spcAft>
+            </a:pPr>
+            <a:r>
+              <a:rPr lang="en-US" sz="1050" dirty="0">
+                <a:solidFill>
+                  <a:srgbClr val="333333"/>
+                </a:solidFill>
+                <a:latin typeface="Verdana" panose="020B0604030504040204" pitchFamily="34" charset="0"/>
+                <a:ea typeface="Calibri" panose="020F0502020204030204" pitchFamily="34" charset="0"/>
+                <a:cs typeface="Times New Roman" panose="02020603050405020304" pitchFamily="18" charset="0"/>
+              </a:rPr>
+              <a:t>If you do not find the new types immediately, simply type “Type” in the search box of the Add New dialog.</a:t>
+            </a:r>
+            <a:endParaRPr lang="en-US" sz="1400" dirty="0">
+              <a:effectLst/>
+              <a:latin typeface="Calibri" panose="020F0502020204030204" pitchFamily="34" charset="0"/>
+              <a:ea typeface="Calibri" panose="020F0502020204030204" pitchFamily="34" charset="0"/>
+              <a:cs typeface="Times New Roman" panose="02020603050405020304" pitchFamily="18" charset="0"/>
+            </a:endParaRPr>
           </a:p>
         </p:txBody>
       </p:sp>
     </p:spTree>
     <p:extLst>
       <p:ext uri="{BB962C8B-B14F-4D97-AF65-F5344CB8AC3E}">
-        <p14:creationId xmlns:p14="http://schemas.microsoft.com/office/powerpoint/2010/main" val="2827216253"/>
+        <p14:creationId xmlns:p14="http://schemas.microsoft.com/office/powerpoint/2010/main" val="1346664465"/>
       </p:ext>
     </p:extLst>
   </p:cSld>
@@ -7273,6 +7836,131 @@
       </p:grpSpPr>
       <p:sp>
         <p:nvSpPr>
+          <p:cNvPr id="2" name="Title 1"/>
+          <p:cNvSpPr>
+            <a:spLocks noGrp="1"/>
+          </p:cNvSpPr>
+          <p:nvPr>
+            <p:ph type="title"/>
+          </p:nvPr>
+        </p:nvSpPr>
+        <p:spPr/>
+        <p:txBody>
+          <a:bodyPr/>
+          <a:lstStyle/>
+          <a:p>
+            <a:r>
+              <a:rPr lang="en-US" dirty="0" smtClean="0"/>
+              <a:t>Demos:</a:t>
+            </a:r>
+            <a:endParaRPr lang="en-US" dirty="0"/>
+          </a:p>
+        </p:txBody>
+      </p:sp>
+      <p:sp>
+        <p:nvSpPr>
+          <p:cNvPr id="3" name="Content Placeholder 2"/>
+          <p:cNvSpPr>
+            <a:spLocks noGrp="1"/>
+          </p:cNvSpPr>
+          <p:nvPr>
+            <p:ph idx="1"/>
+          </p:nvPr>
+        </p:nvSpPr>
+        <p:spPr/>
+        <p:txBody>
+          <a:bodyPr/>
+          <a:lstStyle/>
+          <a:p>
+            <a:r>
+              <a:rPr lang="en-US" dirty="0" smtClean="0"/>
+              <a:t>To Be Continued …</a:t>
+            </a:r>
+          </a:p>
+          <a:p>
+            <a:r>
+              <a:rPr lang="en-US" dirty="0" smtClean="0"/>
+              <a:t>The </a:t>
+            </a:r>
+            <a:r>
+              <a:rPr lang="en-US" dirty="0" err="1" smtClean="0"/>
+              <a:t>TypeScript</a:t>
+            </a:r>
+            <a:r>
+              <a:rPr lang="en-US" dirty="0" smtClean="0"/>
+              <a:t> Type System</a:t>
+            </a:r>
+          </a:p>
+          <a:p>
+            <a:r>
+              <a:rPr lang="en-US" dirty="0" smtClean="0"/>
+              <a:t>Structure in JavaScript</a:t>
+            </a:r>
+          </a:p>
+          <a:p>
+            <a:r>
+              <a:rPr lang="en-US" dirty="0" smtClean="0"/>
+              <a:t>Debugging in JavaScript</a:t>
+            </a:r>
+          </a:p>
+          <a:p>
+            <a:r>
+              <a:rPr lang="en-US" dirty="0" err="1" smtClean="0"/>
+              <a:t>TypeScript</a:t>
+            </a:r>
+            <a:r>
+              <a:rPr lang="en-US" dirty="0" smtClean="0"/>
+              <a:t> with 3</a:t>
+            </a:r>
+            <a:r>
+              <a:rPr lang="en-US" baseline="30000" dirty="0" smtClean="0"/>
+              <a:t>rd</a:t>
+            </a:r>
+            <a:r>
+              <a:rPr lang="en-US" dirty="0" smtClean="0"/>
+              <a:t> Party Libraries</a:t>
+            </a:r>
+          </a:p>
+          <a:p>
+            <a:endParaRPr lang="en-US" dirty="0" smtClean="0"/>
+          </a:p>
+          <a:p>
+            <a:endParaRPr lang="en-US" dirty="0"/>
+          </a:p>
+        </p:txBody>
+      </p:sp>
+    </p:spTree>
+    <p:extLst>
+      <p:ext uri="{BB962C8B-B14F-4D97-AF65-F5344CB8AC3E}">
+        <p14:creationId xmlns:p14="http://schemas.microsoft.com/office/powerpoint/2010/main" val="2827216253"/>
+      </p:ext>
+    </p:extLst>
+  </p:cSld>
+  <p:clrMapOvr>
+    <a:masterClrMapping/>
+  </p:clrMapOvr>
+</p:sld>
+</file>
+
+<file path=ppt/slides/slide14.xml><?xml version="1.0" encoding="utf-8"?>
+<p:sld xmlns:a="http://schemas.openxmlformats.org/drawingml/2006/main" xmlns:r="http://schemas.openxmlformats.org/officeDocument/2006/relationships" xmlns:p="http://schemas.openxmlformats.org/presentationml/2006/main">
+  <p:cSld>
+    <p:spTree>
+      <p:nvGrpSpPr>
+        <p:cNvPr id="1" name=""/>
+        <p:cNvGrpSpPr/>
+        <p:nvPr/>
+      </p:nvGrpSpPr>
+      <p:grpSpPr>
+        <a:xfrm>
+          <a:off x="0" y="0"/>
+          <a:ext cx="0" cy="0"/>
+          <a:chOff x="0" y="0"/>
+          <a:chExt cx="0" cy="0"/>
+        </a:xfrm>
+      </p:grpSpPr>
+      <p:sp>
+        <p:nvSpPr>
           <p:cNvPr id="4" name="Title 3"/>
           <p:cNvSpPr>
             <a:spLocks noGrp="1"/>
@@ -7386,7 +8074,7 @@
 </p:sld>
 </file>
 
-<file path=ppt/slides/slide14.xml><?xml version="1.0" encoding="utf-8"?>
+<file path=ppt/slides/slide15.xml><?xml version="1.0" encoding="utf-8"?>
 <p:sld xmlns:a="http://schemas.openxmlformats.org/drawingml/2006/main" xmlns:r="http://schemas.openxmlformats.org/officeDocument/2006/relationships" xmlns:p="http://schemas.openxmlformats.org/presentationml/2006/main">
   <p:cSld>
     <p:spTree>
@@ -7505,7 +8193,7 @@
 </p:sld>
 </file>
 
-<file path=ppt/slides/slide15.xml><?xml version="1.0" encoding="utf-8"?>
+<file path=ppt/slides/slide16.xml><?xml version="1.0" encoding="utf-8"?>
 <p:sld xmlns:a="http://schemas.openxmlformats.org/drawingml/2006/main" xmlns:r="http://schemas.openxmlformats.org/officeDocument/2006/relationships" xmlns:p="http://schemas.openxmlformats.org/presentationml/2006/main">
   <p:cSld>
     <p:spTree>
@@ -7627,7 +8315,7 @@
 </p:sld>
 </file>
 
-<file path=ppt/slides/slide16.xml><?xml version="1.0" encoding="utf-8"?>
+<file path=ppt/slides/slide17.xml><?xml version="1.0" encoding="utf-8"?>
 <p:sld xmlns:a="http://schemas.openxmlformats.org/drawingml/2006/main" xmlns:r="http://schemas.openxmlformats.org/officeDocument/2006/relationships" xmlns:p="http://schemas.openxmlformats.org/presentationml/2006/main">
   <p:cSld>
     <p:spTree>
@@ -7849,7 +8537,7 @@
 </p:sld>
 </file>
 
-<file path=ppt/slides/slide17.xml><?xml version="1.0" encoding="utf-8"?>
+<file path=ppt/slides/slide18.xml><?xml version="1.0" encoding="utf-8"?>
 <p:sld xmlns:a="http://schemas.openxmlformats.org/drawingml/2006/main" xmlns:r="http://schemas.openxmlformats.org/officeDocument/2006/relationships" xmlns:p="http://schemas.openxmlformats.org/presentationml/2006/main">
   <p:cSld>
     <p:spTree>

</xml_diff>

<commit_message>
added some more links I just found
</commit_message>
<xml_diff>
--- a/20130625_TypeScript.pptx
+++ b/20130625_TypeScript.pptx
@@ -5,7 +5,7 @@
     <p:sldMasterId id="2147483684" r:id="rId1"/>
   </p:sldMasterIdLst>
   <p:notesMasterIdLst>
-    <p:notesMasterId r:id="rId20"/>
+    <p:notesMasterId r:id="rId21"/>
   </p:notesMasterIdLst>
   <p:sldIdLst>
     <p:sldId id="256" r:id="rId2"/>
@@ -25,7 +25,8 @@
     <p:sldId id="369" r:id="rId16"/>
     <p:sldId id="363" r:id="rId17"/>
     <p:sldId id="358" r:id="rId18"/>
-    <p:sldId id="261" r:id="rId19"/>
+    <p:sldId id="377" r:id="rId19"/>
+    <p:sldId id="261" r:id="rId20"/>
   </p:sldIdLst>
   <p:sldSz cx="9144000" cy="6858000" type="screen4x3"/>
   <p:notesSz cx="6858000" cy="9144000"/>
@@ -1112,7 +1113,7 @@
           </a:ln>
           <a:extLst>
             <a:ext uri="{91240B29-F687-4f45-9708-019B960494DF}">
-              <a14:hiddenLine xmlns="" xmlns:a14="http://schemas.microsoft.com/office/drawing/2010/main" w="9525">
+              <a14:hiddenLine xmlns:a14="http://schemas.microsoft.com/office/drawing/2010/main" xmlns="" w="9525">
                 <a:solidFill>
                   <a:srgbClr val="000000"/>
                 </a:solidFill>
@@ -1167,7 +1168,7 @@
           </a:ln>
           <a:extLst>
             <a:ext uri="{91240B29-F687-4f45-9708-019B960494DF}">
-              <a14:hiddenLine xmlns="" xmlns:a14="http://schemas.microsoft.com/office/drawing/2010/main" w="9525">
+              <a14:hiddenLine xmlns:a14="http://schemas.microsoft.com/office/drawing/2010/main" xmlns="" w="9525">
                 <a:solidFill>
                   <a:srgbClr val="000000"/>
                 </a:solidFill>
@@ -8538,6 +8539,195 @@
 </file>
 
 <file path=ppt/slides/slide18.xml><?xml version="1.0" encoding="utf-8"?>
+<p:sld xmlns:a="http://schemas.openxmlformats.org/drawingml/2006/main" xmlns:r="http://schemas.openxmlformats.org/officeDocument/2006/relationships" xmlns:p="http://schemas.openxmlformats.org/presentationml/2006/main">
+  <p:cSld>
+    <p:spTree>
+      <p:nvGrpSpPr>
+        <p:cNvPr id="1" name=""/>
+        <p:cNvGrpSpPr/>
+        <p:nvPr/>
+      </p:nvGrpSpPr>
+      <p:grpSpPr>
+        <a:xfrm>
+          <a:off x="0" y="0"/>
+          <a:ext cx="0" cy="0"/>
+          <a:chOff x="0" y="0"/>
+          <a:chExt cx="0" cy="0"/>
+        </a:xfrm>
+      </p:grpSpPr>
+      <p:sp>
+        <p:nvSpPr>
+          <p:cNvPr id="2" name="Title 1"/>
+          <p:cNvSpPr>
+            <a:spLocks noGrp="1"/>
+          </p:cNvSpPr>
+          <p:nvPr>
+            <p:ph type="title"/>
+          </p:nvPr>
+        </p:nvSpPr>
+        <p:spPr/>
+        <p:txBody>
+          <a:bodyPr/>
+          <a:lstStyle/>
+          <a:p>
+            <a:r>
+              <a:rPr lang="en-US" dirty="0" smtClean="0"/>
+              <a:t>Even More Links</a:t>
+            </a:r>
+            <a:endParaRPr lang="en-US" dirty="0"/>
+          </a:p>
+        </p:txBody>
+      </p:sp>
+      <p:sp>
+        <p:nvSpPr>
+          <p:cNvPr id="3" name="Content Placeholder 2"/>
+          <p:cNvSpPr>
+            <a:spLocks noGrp="1"/>
+          </p:cNvSpPr>
+          <p:nvPr>
+            <p:ph idx="1"/>
+          </p:nvPr>
+        </p:nvSpPr>
+        <p:spPr/>
+        <p:txBody>
+          <a:bodyPr>
+            <a:normAutofit fontScale="92500"/>
+          </a:bodyPr>
+          <a:lstStyle/>
+          <a:p>
+            <a:r>
+              <a:rPr lang="en-US" dirty="0" err="1" smtClean="0"/>
+              <a:t>VSLive</a:t>
+            </a:r>
+            <a:r>
+              <a:rPr lang="en-US" dirty="0"/>
+              <a:t>: Hate JavaScript? Try </a:t>
+            </a:r>
+            <a:r>
+              <a:rPr lang="en-US" dirty="0" err="1"/>
+              <a:t>TypeScript</a:t>
+            </a:r>
+            <a:r>
+              <a:rPr lang="en-US" dirty="0" smtClean="0"/>
+              <a:t>!</a:t>
+            </a:r>
+          </a:p>
+          <a:p>
+            <a:pPr lvl="1"/>
+            <a:r>
+              <a:rPr lang="en-US" dirty="0" smtClean="0"/>
+              <a:t>By Ben </a:t>
+            </a:r>
+            <a:r>
+              <a:rPr lang="en-US" dirty="0" err="1" smtClean="0"/>
+              <a:t>Hoelting</a:t>
+            </a:r>
+            <a:endParaRPr lang="en-US" dirty="0" smtClean="0"/>
+          </a:p>
+          <a:p>
+            <a:pPr lvl="1"/>
+            <a:r>
+              <a:rPr lang="en-US" dirty="0">
+                <a:hlinkClick r:id="rId2"/>
+              </a:rPr>
+              <a:t>http://</a:t>
+            </a:r>
+            <a:r>
+              <a:rPr lang="en-US" dirty="0" smtClean="0">
+                <a:hlinkClick r:id="rId2"/>
+              </a:rPr>
+              <a:t>visualstudiomagazine.com/blogs/vs-live-video/2013/05/typescript-video.aspx</a:t>
+            </a:r>
+            <a:endParaRPr lang="en-US" dirty="0" smtClean="0"/>
+          </a:p>
+          <a:p>
+            <a:r>
+              <a:rPr lang="en-US" dirty="0"/>
+              <a:t>A </a:t>
+            </a:r>
+            <a:r>
+              <a:rPr lang="en-US" dirty="0" err="1"/>
+              <a:t>TypeScript</a:t>
+            </a:r>
+            <a:r>
+              <a:rPr lang="en-US" dirty="0"/>
+              <a:t> </a:t>
+            </a:r>
+            <a:r>
+              <a:rPr lang="en-US" dirty="0" smtClean="0"/>
+              <a:t>Primer</a:t>
+            </a:r>
+          </a:p>
+          <a:p>
+            <a:pPr lvl="1"/>
+            <a:r>
+              <a:rPr lang="en-US" dirty="0" smtClean="0"/>
+              <a:t>By Mark </a:t>
+            </a:r>
+            <a:r>
+              <a:rPr lang="en-US" dirty="0" err="1" smtClean="0"/>
+              <a:t>Michaelis</a:t>
+            </a:r>
+            <a:endParaRPr lang="en-US" dirty="0" smtClean="0"/>
+          </a:p>
+          <a:p>
+            <a:pPr lvl="1"/>
+            <a:r>
+              <a:rPr lang="en-US" dirty="0">
+                <a:hlinkClick r:id="rId3"/>
+              </a:rPr>
+              <a:t>http://</a:t>
+            </a:r>
+            <a:r>
+              <a:rPr lang="en-US" dirty="0" smtClean="0">
+                <a:hlinkClick r:id="rId3"/>
+              </a:rPr>
+              <a:t>visualstudiomagazine.com/articles/2013/02/01/typescript.aspx</a:t>
+            </a:r>
+            <a:endParaRPr lang="en-US" dirty="0" smtClean="0"/>
+          </a:p>
+          <a:p>
+            <a:r>
+              <a:rPr lang="en-US" dirty="0"/>
+              <a:t>Test-Driven Development with </a:t>
+            </a:r>
+            <a:r>
+              <a:rPr lang="en-US" dirty="0" err="1" smtClean="0"/>
+              <a:t>TypeScript</a:t>
+            </a:r>
+            <a:endParaRPr lang="en-US" dirty="0"/>
+          </a:p>
+          <a:p>
+            <a:pPr lvl="1"/>
+            <a:r>
+              <a:rPr lang="en-US" dirty="0" smtClean="0"/>
+              <a:t>By Peter Vogel</a:t>
+            </a:r>
+          </a:p>
+          <a:p>
+            <a:pPr lvl="1"/>
+            <a:r>
+              <a:rPr lang="en-US"/>
+              <a:t>http://visualstudiomagazine.com/articles/2013/06/01/test-driven-development-with-typescript.aspx</a:t>
+            </a:r>
+            <a:endParaRPr lang="en-US" dirty="0"/>
+          </a:p>
+        </p:txBody>
+      </p:sp>
+    </p:spTree>
+    <p:extLst>
+      <p:ext uri="{BB962C8B-B14F-4D97-AF65-F5344CB8AC3E}">
+        <p14:creationId xmlns:p14="http://schemas.microsoft.com/office/powerpoint/2010/main" val="3203952068"/>
+      </p:ext>
+    </p:extLst>
+  </p:cSld>
+  <p:clrMapOvr>
+    <a:masterClrMapping/>
+  </p:clrMapOvr>
+</p:sld>
+</file>
+
+<file path=ppt/slides/slide19.xml><?xml version="1.0" encoding="utf-8"?>
 <p:sld xmlns:a="http://schemas.openxmlformats.org/drawingml/2006/main" xmlns:r="http://schemas.openxmlformats.org/officeDocument/2006/relationships" xmlns:p="http://schemas.openxmlformats.org/presentationml/2006/main">
   <p:cSld>
     <p:spTree>

</xml_diff>